<commit_message>
Hab mal ne Anleitung für VPN und das Training geschrieben, zu finden unter meetings->getting started
</commit_message>
<xml_diff>
--- a/meetings/template/cv_lab_template.pptx
+++ b/meetings/template/cv_lab_template.pptx
@@ -5,13 +5,13 @@
     <p:sldMasterId id="2147483648" r:id="rId1"/>
   </p:sldMasterIdLst>
   <p:notesMasterIdLst>
-    <p:notesMasterId r:id="rId4"/>
+    <p:notesMasterId r:id="rId3"/>
   </p:notesMasterIdLst>
   <p:handoutMasterIdLst>
-    <p:handoutMasterId r:id="rId5"/>
+    <p:handoutMasterId r:id="rId4"/>
   </p:handoutMasterIdLst>
   <p:sldIdLst>
-    <p:sldId id="256" r:id="rId3"/>
+    <p:sldId id="256" r:id="rId2"/>
   </p:sldIdLst>
   <p:sldSz cx="9144000" cy="6858000" type="screen4x3"/>
   <p:notesSz cx="6858000" cy="9144000"/>
@@ -140,7 +140,351 @@
       </a:defRPr>
     </a:lvl9pPr>
   </p:defaultTextStyle>
+  <p:extLst>
+    <p:ext uri="{EFAFB233-063F-42B5-8137-9DF3F51BA10A}">
+      <p15:sldGuideLst xmlns:p15="http://schemas.microsoft.com/office/powerpoint/2012/main">
+        <p15:guide id="1" orient="horz" pos="2160">
+          <p15:clr>
+            <a:srgbClr val="A4A3A4"/>
+          </p15:clr>
+        </p15:guide>
+        <p15:guide id="2" pos="2880">
+          <p15:clr>
+            <a:srgbClr val="A4A3A4"/>
+          </p15:clr>
+        </p15:guide>
+      </p15:sldGuideLst>
+    </p:ext>
+    <p:ext uri="{2D200454-40CA-4A62-9FC3-DE9A4176ACB9}">
+      <p15:notesGuideLst xmlns:p15="http://schemas.microsoft.com/office/powerpoint/2012/main"/>
+    </p:ext>
+  </p:extLst>
 </p:presentation>
+</file>
+
+<file path=ppt/revisionInfo.xml><?xml version="1.0" encoding="utf-8"?>
+<p1510:revInfo xmlns:a="http://schemas.openxmlformats.org/drawingml/2006/main" xmlns:r="http://schemas.openxmlformats.org/officeDocument/2006/relationships" xmlns:p1510="http://schemas.microsoft.com/office/powerpoint/2015/10/main">
+  <p1510:revLst>
+    <p1510:client id="{F3F525BD-AF38-46CF-B90E-84D35B540911}" v="70" dt="2019-12-07T13:17:09.945"/>
+  </p1510:revLst>
+</p1510:revInfo>
+</file>
+
+<file path=ppt/changesInfos/changesInfo1.xml><?xml version="1.0" encoding="utf-8"?>
+<pc:chgInfo xmlns:a="http://schemas.openxmlformats.org/drawingml/2006/main" xmlns:r="http://schemas.openxmlformats.org/officeDocument/2006/relationships" xmlns:ac="http://schemas.microsoft.com/office/drawing/2013/main/command" xmlns:pc="http://schemas.microsoft.com/office/powerpoint/2013/main/command">
+  <pc:docChgLst>
+    <pc:chgData name="Jan Coccejus" userId="47bc5df8abf4f7df" providerId="LiveId" clId="{F3F525BD-AF38-46CF-B90E-84D35B540911}"/>
+    <pc:docChg chg="undo custSel addSld delSld modSld">
+      <pc:chgData name="Jan Coccejus" userId="47bc5df8abf4f7df" providerId="LiveId" clId="{F3F525BD-AF38-46CF-B90E-84D35B540911}" dt="2019-12-07T13:21:05.069" v="3927" actId="20577"/>
+      <pc:docMkLst>
+        <pc:docMk/>
+      </pc:docMkLst>
+      <pc:sldChg chg="modSp">
+        <pc:chgData name="Jan Coccejus" userId="47bc5df8abf4f7df" providerId="LiveId" clId="{F3F525BD-AF38-46CF-B90E-84D35B540911}" dt="2019-12-07T13:21:05.069" v="3927" actId="20577"/>
+        <pc:sldMkLst>
+          <pc:docMk/>
+          <pc:sldMk cId="0" sldId="256"/>
+        </pc:sldMkLst>
+        <pc:spChg chg="mod">
+          <ac:chgData name="Jan Coccejus" userId="47bc5df8abf4f7df" providerId="LiveId" clId="{F3F525BD-AF38-46CF-B90E-84D35B540911}" dt="2019-12-07T13:21:05.069" v="3927" actId="20577"/>
+          <ac:spMkLst>
+            <pc:docMk/>
+            <pc:sldMk cId="0" sldId="256"/>
+            <ac:spMk id="2" creationId="{00000000-0000-0000-0000-000000000000}"/>
+          </ac:spMkLst>
+        </pc:spChg>
+      </pc:sldChg>
+      <pc:sldChg chg="addSp modSp add del">
+        <pc:chgData name="Jan Coccejus" userId="47bc5df8abf4f7df" providerId="LiveId" clId="{F3F525BD-AF38-46CF-B90E-84D35B540911}" dt="2019-12-07T13:20:54.561" v="3912" actId="47"/>
+        <pc:sldMkLst>
+          <pc:docMk/>
+          <pc:sldMk cId="2826224902" sldId="257"/>
+        </pc:sldMkLst>
+        <pc:spChg chg="mod">
+          <ac:chgData name="Jan Coccejus" userId="47bc5df8abf4f7df" providerId="LiveId" clId="{F3F525BD-AF38-46CF-B90E-84D35B540911}" dt="2019-12-07T11:57:53.683" v="59" actId="20577"/>
+          <ac:spMkLst>
+            <pc:docMk/>
+            <pc:sldMk cId="2826224902" sldId="257"/>
+            <ac:spMk id="2" creationId="{199A6DD9-E428-4CE5-ADEA-0CC035E04B6D}"/>
+          </ac:spMkLst>
+        </pc:spChg>
+        <pc:spChg chg="mod">
+          <ac:chgData name="Jan Coccejus" userId="47bc5df8abf4f7df" providerId="LiveId" clId="{F3F525BD-AF38-46CF-B90E-84D35B540911}" dt="2019-12-07T12:29:34.926" v="1670" actId="403"/>
+          <ac:spMkLst>
+            <pc:docMk/>
+            <pc:sldMk cId="2826224902" sldId="257"/>
+            <ac:spMk id="3" creationId="{B3F2791F-5942-4C24-9B79-3A441C6B3A75}"/>
+          </ac:spMkLst>
+        </pc:spChg>
+        <pc:picChg chg="add mod">
+          <ac:chgData name="Jan Coccejus" userId="47bc5df8abf4f7df" providerId="LiveId" clId="{F3F525BD-AF38-46CF-B90E-84D35B540911}" dt="2019-12-07T12:06:22.339" v="436" actId="1037"/>
+          <ac:picMkLst>
+            <pc:docMk/>
+            <pc:sldMk cId="2826224902" sldId="257"/>
+            <ac:picMk id="4" creationId="{9F26453C-271E-45F1-A453-48691452310E}"/>
+          </ac:picMkLst>
+        </pc:picChg>
+        <pc:picChg chg="add mod">
+          <ac:chgData name="Jan Coccejus" userId="47bc5df8abf4f7df" providerId="LiveId" clId="{F3F525BD-AF38-46CF-B90E-84D35B540911}" dt="2019-12-07T12:11:08.231" v="769" actId="1076"/>
+          <ac:picMkLst>
+            <pc:docMk/>
+            <pc:sldMk cId="2826224902" sldId="257"/>
+            <ac:picMk id="5" creationId="{0D0DD88B-495E-4352-B7F9-20E7CB32E356}"/>
+          </ac:picMkLst>
+        </pc:picChg>
+      </pc:sldChg>
+      <pc:sldChg chg="addSp delSp modSp add del">
+        <pc:chgData name="Jan Coccejus" userId="47bc5df8abf4f7df" providerId="LiveId" clId="{F3F525BD-AF38-46CF-B90E-84D35B540911}" dt="2019-12-07T13:20:55.344" v="3913" actId="47"/>
+        <pc:sldMkLst>
+          <pc:docMk/>
+          <pc:sldMk cId="1645197297" sldId="258"/>
+        </pc:sldMkLst>
+        <pc:spChg chg="mod">
+          <ac:chgData name="Jan Coccejus" userId="47bc5df8abf4f7df" providerId="LiveId" clId="{F3F525BD-AF38-46CF-B90E-84D35B540911}" dt="2019-12-07T12:13:59.851" v="853" actId="20577"/>
+          <ac:spMkLst>
+            <pc:docMk/>
+            <pc:sldMk cId="1645197297" sldId="258"/>
+            <ac:spMk id="2" creationId="{06739EB7-67DC-414C-9DAB-5173A77963C4}"/>
+          </ac:spMkLst>
+        </pc:spChg>
+        <pc:spChg chg="mod">
+          <ac:chgData name="Jan Coccejus" userId="47bc5df8abf4f7df" providerId="LiveId" clId="{F3F525BD-AF38-46CF-B90E-84D35B540911}" dt="2019-12-07T12:28:55.736" v="1668" actId="33524"/>
+          <ac:spMkLst>
+            <pc:docMk/>
+            <pc:sldMk cId="1645197297" sldId="258"/>
+            <ac:spMk id="3" creationId="{5DF7D0CF-25A6-48D5-9C24-55DEDD3D1619}"/>
+          </ac:spMkLst>
+        </pc:spChg>
+        <pc:picChg chg="add mod">
+          <ac:chgData name="Jan Coccejus" userId="47bc5df8abf4f7df" providerId="LiveId" clId="{F3F525BD-AF38-46CF-B90E-84D35B540911}" dt="2019-12-07T12:25:06.638" v="1258" actId="1076"/>
+          <ac:picMkLst>
+            <pc:docMk/>
+            <pc:sldMk cId="1645197297" sldId="258"/>
+            <ac:picMk id="4" creationId="{27654E1C-3B6F-4BC8-A751-844BFE9DEB99}"/>
+          </ac:picMkLst>
+        </pc:picChg>
+        <pc:picChg chg="add del mod">
+          <ac:chgData name="Jan Coccejus" userId="47bc5df8abf4f7df" providerId="LiveId" clId="{F3F525BD-AF38-46CF-B90E-84D35B540911}" dt="2019-12-07T12:24:35.014" v="1251" actId="478"/>
+          <ac:picMkLst>
+            <pc:docMk/>
+            <pc:sldMk cId="1645197297" sldId="258"/>
+            <ac:picMk id="5" creationId="{E70EE12E-C2FE-4CA3-85C9-27F816F65657}"/>
+          </ac:picMkLst>
+        </pc:picChg>
+        <pc:picChg chg="add mod">
+          <ac:chgData name="Jan Coccejus" userId="47bc5df8abf4f7df" providerId="LiveId" clId="{F3F525BD-AF38-46CF-B90E-84D35B540911}" dt="2019-12-07T12:25:11.025" v="1260" actId="14100"/>
+          <ac:picMkLst>
+            <pc:docMk/>
+            <pc:sldMk cId="1645197297" sldId="258"/>
+            <ac:picMk id="6" creationId="{F4EEF9FE-CC72-477D-9FDD-6453BD1997C0}"/>
+          </ac:picMkLst>
+        </pc:picChg>
+        <pc:picChg chg="add mod">
+          <ac:chgData name="Jan Coccejus" userId="47bc5df8abf4f7df" providerId="LiveId" clId="{F3F525BD-AF38-46CF-B90E-84D35B540911}" dt="2019-12-07T12:27:31.617" v="1415" actId="1076"/>
+          <ac:picMkLst>
+            <pc:docMk/>
+            <pc:sldMk cId="1645197297" sldId="258"/>
+            <ac:picMk id="7" creationId="{0ABCB95A-E576-47B9-AC67-929259CF05B5}"/>
+          </ac:picMkLst>
+        </pc:picChg>
+      </pc:sldChg>
+      <pc:sldChg chg="addSp modSp add del">
+        <pc:chgData name="Jan Coccejus" userId="47bc5df8abf4f7df" providerId="LiveId" clId="{F3F525BD-AF38-46CF-B90E-84D35B540911}" dt="2019-12-07T13:20:55.961" v="3914" actId="47"/>
+        <pc:sldMkLst>
+          <pc:docMk/>
+          <pc:sldMk cId="1854701426" sldId="259"/>
+        </pc:sldMkLst>
+        <pc:spChg chg="mod">
+          <ac:chgData name="Jan Coccejus" userId="47bc5df8abf4f7df" providerId="LiveId" clId="{F3F525BD-AF38-46CF-B90E-84D35B540911}" dt="2019-12-07T12:30:26.916" v="1757" actId="20577"/>
+          <ac:spMkLst>
+            <pc:docMk/>
+            <pc:sldMk cId="1854701426" sldId="259"/>
+            <ac:spMk id="2" creationId="{74C66A66-93EB-4865-8DD3-99DDAA5C8017}"/>
+          </ac:spMkLst>
+        </pc:spChg>
+        <pc:spChg chg="mod">
+          <ac:chgData name="Jan Coccejus" userId="47bc5df8abf4f7df" providerId="LiveId" clId="{F3F525BD-AF38-46CF-B90E-84D35B540911}" dt="2019-12-07T12:40:25.674" v="2210" actId="20577"/>
+          <ac:spMkLst>
+            <pc:docMk/>
+            <pc:sldMk cId="1854701426" sldId="259"/>
+            <ac:spMk id="3" creationId="{78AE9A51-A1AA-401F-8993-06BF6E34EDA0}"/>
+          </ac:spMkLst>
+        </pc:spChg>
+        <pc:picChg chg="add mod">
+          <ac:chgData name="Jan Coccejus" userId="47bc5df8abf4f7df" providerId="LiveId" clId="{F3F525BD-AF38-46CF-B90E-84D35B540911}" dt="2019-12-07T12:39:15.241" v="2078" actId="1076"/>
+          <ac:picMkLst>
+            <pc:docMk/>
+            <pc:sldMk cId="1854701426" sldId="259"/>
+            <ac:picMk id="4" creationId="{4AF64221-99FA-4A4B-921B-D30898C03C83}"/>
+          </ac:picMkLst>
+        </pc:picChg>
+      </pc:sldChg>
+      <pc:sldChg chg="addSp delSp modSp add del">
+        <pc:chgData name="Jan Coccejus" userId="47bc5df8abf4f7df" providerId="LiveId" clId="{F3F525BD-AF38-46CF-B90E-84D35B540911}" dt="2019-12-07T13:20:56.528" v="3915" actId="47"/>
+        <pc:sldMkLst>
+          <pc:docMk/>
+          <pc:sldMk cId="329844345" sldId="260"/>
+        </pc:sldMkLst>
+        <pc:spChg chg="mod">
+          <ac:chgData name="Jan Coccejus" userId="47bc5df8abf4f7df" providerId="LiveId" clId="{F3F525BD-AF38-46CF-B90E-84D35B540911}" dt="2019-12-07T12:41:07.630" v="2267" actId="20577"/>
+          <ac:spMkLst>
+            <pc:docMk/>
+            <pc:sldMk cId="329844345" sldId="260"/>
+            <ac:spMk id="2" creationId="{10467727-F5D9-4F64-B00C-F901ECF61A23}"/>
+          </ac:spMkLst>
+        </pc:spChg>
+        <pc:spChg chg="mod">
+          <ac:chgData name="Jan Coccejus" userId="47bc5df8abf4f7df" providerId="LiveId" clId="{F3F525BD-AF38-46CF-B90E-84D35B540911}" dt="2019-12-07T12:49:47.723" v="2531" actId="20577"/>
+          <ac:spMkLst>
+            <pc:docMk/>
+            <pc:sldMk cId="329844345" sldId="260"/>
+            <ac:spMk id="3" creationId="{30CDEBD1-ABE2-4FDF-8BD4-D1BDB5F87ABD}"/>
+          </ac:spMkLst>
+        </pc:spChg>
+        <pc:spChg chg="add del">
+          <ac:chgData name="Jan Coccejus" userId="47bc5df8abf4f7df" providerId="LiveId" clId="{F3F525BD-AF38-46CF-B90E-84D35B540911}" dt="2019-12-07T12:48:44.121" v="2505"/>
+          <ac:spMkLst>
+            <pc:docMk/>
+            <pc:sldMk cId="329844345" sldId="260"/>
+            <ac:spMk id="4" creationId="{CE754CB7-028C-444A-9006-022C41E7D772}"/>
+          </ac:spMkLst>
+        </pc:spChg>
+        <pc:spChg chg="add del">
+          <ac:chgData name="Jan Coccejus" userId="47bc5df8abf4f7df" providerId="LiveId" clId="{F3F525BD-AF38-46CF-B90E-84D35B540911}" dt="2019-12-07T12:48:43.671" v="2504"/>
+          <ac:spMkLst>
+            <pc:docMk/>
+            <pc:sldMk cId="329844345" sldId="260"/>
+            <ac:spMk id="5" creationId="{C047716D-EB4F-4493-9145-76A2079F324F}"/>
+          </ac:spMkLst>
+        </pc:spChg>
+        <pc:spChg chg="add mod">
+          <ac:chgData name="Jan Coccejus" userId="47bc5df8abf4f7df" providerId="LiveId" clId="{F3F525BD-AF38-46CF-B90E-84D35B540911}" dt="2019-12-07T12:49:15.154" v="2522"/>
+          <ac:spMkLst>
+            <pc:docMk/>
+            <pc:sldMk cId="329844345" sldId="260"/>
+            <ac:spMk id="6" creationId="{01006C40-06E0-406E-A30D-32C1A6FACFFC}"/>
+          </ac:spMkLst>
+        </pc:spChg>
+      </pc:sldChg>
+      <pc:sldChg chg="addSp delSp modSp add del">
+        <pc:chgData name="Jan Coccejus" userId="47bc5df8abf4f7df" providerId="LiveId" clId="{F3F525BD-AF38-46CF-B90E-84D35B540911}" dt="2019-12-07T13:20:57.116" v="3916" actId="47"/>
+        <pc:sldMkLst>
+          <pc:docMk/>
+          <pc:sldMk cId="30224450" sldId="261"/>
+        </pc:sldMkLst>
+        <pc:spChg chg="mod">
+          <ac:chgData name="Jan Coccejus" userId="47bc5df8abf4f7df" providerId="LiveId" clId="{F3F525BD-AF38-46CF-B90E-84D35B540911}" dt="2019-12-07T12:50:32.197" v="2564" actId="20577"/>
+          <ac:spMkLst>
+            <pc:docMk/>
+            <pc:sldMk cId="30224450" sldId="261"/>
+            <ac:spMk id="2" creationId="{90141DDB-EAEB-42CB-81AC-C78C9B5337F6}"/>
+          </ac:spMkLst>
+        </pc:spChg>
+        <pc:spChg chg="mod">
+          <ac:chgData name="Jan Coccejus" userId="47bc5df8abf4f7df" providerId="LiveId" clId="{F3F525BD-AF38-46CF-B90E-84D35B540911}" dt="2019-12-07T13:15:28.849" v="3843" actId="20577"/>
+          <ac:spMkLst>
+            <pc:docMk/>
+            <pc:sldMk cId="30224450" sldId="261"/>
+            <ac:spMk id="3" creationId="{C85F8BF4-60EA-405E-B6FD-5140316DCA77}"/>
+          </ac:spMkLst>
+        </pc:spChg>
+        <pc:spChg chg="add del">
+          <ac:chgData name="Jan Coccejus" userId="47bc5df8abf4f7df" providerId="LiveId" clId="{F3F525BD-AF38-46CF-B90E-84D35B540911}" dt="2019-12-07T12:52:45.297" v="2751"/>
+          <ac:spMkLst>
+            <pc:docMk/>
+            <pc:sldMk cId="30224450" sldId="261"/>
+            <ac:spMk id="4" creationId="{E597A4AA-BCB4-4CC2-8AAC-D5FC5CCCA34D}"/>
+          </ac:spMkLst>
+        </pc:spChg>
+        <pc:spChg chg="add mod">
+          <ac:chgData name="Jan Coccejus" userId="47bc5df8abf4f7df" providerId="LiveId" clId="{F3F525BD-AF38-46CF-B90E-84D35B540911}" dt="2019-12-07T13:15:33.225" v="3844" actId="1076"/>
+          <ac:spMkLst>
+            <pc:docMk/>
+            <pc:sldMk cId="30224450" sldId="261"/>
+            <ac:spMk id="5" creationId="{75BA28B5-F4FB-4EFF-933F-57015FB24FD6}"/>
+          </ac:spMkLst>
+        </pc:spChg>
+      </pc:sldChg>
+      <pc:sldChg chg="modSp add del">
+        <pc:chgData name="Jan Coccejus" userId="47bc5df8abf4f7df" providerId="LiveId" clId="{F3F525BD-AF38-46CF-B90E-84D35B540911}" dt="2019-12-07T13:20:57.771" v="3917" actId="47"/>
+        <pc:sldMkLst>
+          <pc:docMk/>
+          <pc:sldMk cId="3731752756" sldId="262"/>
+        </pc:sldMkLst>
+        <pc:spChg chg="mod">
+          <ac:chgData name="Jan Coccejus" userId="47bc5df8abf4f7df" providerId="LiveId" clId="{F3F525BD-AF38-46CF-B90E-84D35B540911}" dt="2019-12-07T13:01:31.468" v="3044" actId="20577"/>
+          <ac:spMkLst>
+            <pc:docMk/>
+            <pc:sldMk cId="3731752756" sldId="262"/>
+            <ac:spMk id="2" creationId="{88632975-68D8-4507-B181-0795CFD396C4}"/>
+          </ac:spMkLst>
+        </pc:spChg>
+        <pc:spChg chg="mod">
+          <ac:chgData name="Jan Coccejus" userId="47bc5df8abf4f7df" providerId="LiveId" clId="{F3F525BD-AF38-46CF-B90E-84D35B540911}" dt="2019-12-07T13:09:01.327" v="3428"/>
+          <ac:spMkLst>
+            <pc:docMk/>
+            <pc:sldMk cId="3731752756" sldId="262"/>
+            <ac:spMk id="3" creationId="{03CC5EF5-BE4E-4F02-B6D8-1B08C2E28D72}"/>
+          </ac:spMkLst>
+        </pc:spChg>
+      </pc:sldChg>
+      <pc:sldChg chg="addSp delSp modSp add del">
+        <pc:chgData name="Jan Coccejus" userId="47bc5df8abf4f7df" providerId="LiveId" clId="{F3F525BD-AF38-46CF-B90E-84D35B540911}" dt="2019-12-07T13:20:58.315" v="3918" actId="47"/>
+        <pc:sldMkLst>
+          <pc:docMk/>
+          <pc:sldMk cId="3545501816" sldId="263"/>
+        </pc:sldMkLst>
+        <pc:spChg chg="mod">
+          <ac:chgData name="Jan Coccejus" userId="47bc5df8abf4f7df" providerId="LiveId" clId="{F3F525BD-AF38-46CF-B90E-84D35B540911}" dt="2019-12-07T13:16:29.214" v="3887" actId="20577"/>
+          <ac:spMkLst>
+            <pc:docMk/>
+            <pc:sldMk cId="3545501816" sldId="263"/>
+            <ac:spMk id="2" creationId="{B3721EFE-DC43-4CD4-BD5A-9DCD559C2A42}"/>
+          </ac:spMkLst>
+        </pc:spChg>
+        <pc:spChg chg="mod">
+          <ac:chgData name="Jan Coccejus" userId="47bc5df8abf4f7df" providerId="LiveId" clId="{F3F525BD-AF38-46CF-B90E-84D35B540911}" dt="2019-12-07T13:17:13.882" v="3911" actId="20577"/>
+          <ac:spMkLst>
+            <pc:docMk/>
+            <pc:sldMk cId="3545501816" sldId="263"/>
+            <ac:spMk id="3" creationId="{019A0F80-AC65-4AFD-8E28-DC507AB6EF09}"/>
+          </ac:spMkLst>
+        </pc:spChg>
+        <pc:spChg chg="add del">
+          <ac:chgData name="Jan Coccejus" userId="47bc5df8abf4f7df" providerId="LiveId" clId="{F3F525BD-AF38-46CF-B90E-84D35B540911}" dt="2019-12-07T13:11:16.920" v="3534"/>
+          <ac:spMkLst>
+            <pc:docMk/>
+            <pc:sldMk cId="3545501816" sldId="263"/>
+            <ac:spMk id="4" creationId="{E8366DC3-210E-4EBC-89A1-F06BD52FEFA5}"/>
+          </ac:spMkLst>
+        </pc:spChg>
+      </pc:sldChg>
+      <pc:sldChg chg="modSp add del">
+        <pc:chgData name="Jan Coccejus" userId="47bc5df8abf4f7df" providerId="LiveId" clId="{F3F525BD-AF38-46CF-B90E-84D35B540911}" dt="2019-12-07T13:20:58.872" v="3919" actId="47"/>
+        <pc:sldMkLst>
+          <pc:docMk/>
+          <pc:sldMk cId="49593266" sldId="264"/>
+        </pc:sldMkLst>
+        <pc:spChg chg="mod">
+          <ac:chgData name="Jan Coccejus" userId="47bc5df8abf4f7df" providerId="LiveId" clId="{F3F525BD-AF38-46CF-B90E-84D35B540911}" dt="2019-12-07T13:16:58.536" v="3905" actId="20577"/>
+          <ac:spMkLst>
+            <pc:docMk/>
+            <pc:sldMk cId="49593266" sldId="264"/>
+            <ac:spMk id="2" creationId="{A7F58296-3D6B-417F-BA7F-92BE664EDB84}"/>
+          </ac:spMkLst>
+        </pc:spChg>
+        <pc:spChg chg="mod">
+          <ac:chgData name="Jan Coccejus" userId="47bc5df8abf4f7df" providerId="LiveId" clId="{F3F525BD-AF38-46CF-B90E-84D35B540911}" dt="2019-12-07T13:17:09.945" v="3908"/>
+          <ac:spMkLst>
+            <pc:docMk/>
+            <pc:sldMk cId="49593266" sldId="264"/>
+            <ac:spMk id="3" creationId="{F67F1CB7-B79C-4A2E-90EF-CED73DA74A35}"/>
+          </ac:spMkLst>
+        </pc:spChg>
+      </pc:sldChg>
+    </pc:docChg>
+  </pc:docChgLst>
+</pc:chgInfo>
 </file>
 
 <file path=ppt/handoutMasters/handoutMaster1.xml><?xml version="1.0" encoding="utf-8"?>
@@ -247,6 +591,7 @@
           <a:p>
             <a:fld id="{A32DC80D-291A-4ABB-A78B-0417274A267C}" type="datetime4">
               <a:rPr lang="de-DE"/>
+              <a:t>7. Dezember 2019</a:t>
             </a:fld>
             <a:endParaRPr lang="de-DE"/>
           </a:p>
@@ -291,7 +636,6 @@
               <a:rPr lang="de-DE"/>
               <a:t>|  </a:t>
             </a:r>
-            <a:endParaRPr lang="de-DE"/>
           </a:p>
         </p:txBody>
       </p:sp>
@@ -336,6 +680,7 @@
             </a:r>
             <a:fld id="{C7CC2173-B0D1-45F1-9D54-E33B7353DA19}" type="slidenum">
               <a:rPr lang="de-DE"/>
+              <a:t>‹Nr.›</a:t>
             </a:fld>
             <a:endParaRPr lang="de-DE"/>
           </a:p>
@@ -350,7 +695,7 @@
           <p:nvPr/>
         </p:nvPicPr>
         <p:blipFill>
-          <a:blip r:embed="rId1" cstate="print"/>
+          <a:blip r:embed="rId2" cstate="print"/>
           <a:srcRect/>
           <a:stretch>
             <a:fillRect/>
@@ -539,7 +884,7 @@
           <p:nvPr/>
         </p:nvPicPr>
         <p:blipFill>
-          <a:blip r:embed="rId1"/>
+          <a:blip r:embed="rId2"/>
           <a:srcRect/>
           <a:stretch>
             <a:fillRect/>
@@ -596,6 +941,7 @@
           <a:p>
             <a:fld id="{065B079B-E513-489A-8A1B-D7C78493EA86}" type="datetime4">
               <a:rPr lang="de-DE"/>
+              <a:t>7. Dezember 2019</a:t>
             </a:fld>
             <a:endParaRPr lang="de-DE"/>
           </a:p>
@@ -660,42 +1006,37 @@
           <a:p>
             <a:pPr lvl="0"/>
             <a:r>
-              <a:rPr lang="de-DE" smtClean="0"/>
+              <a:rPr lang="de-DE"/>
               <a:t>Textmasterformate durch Klicken bearbeiten</a:t>
             </a:r>
-            <a:endParaRPr lang="de-DE" smtClean="0"/>
           </a:p>
           <a:p>
             <a:pPr lvl="1"/>
             <a:r>
-              <a:rPr lang="de-DE" smtClean="0"/>
+              <a:rPr lang="de-DE"/>
               <a:t>Zweite Ebene</a:t>
             </a:r>
-            <a:endParaRPr lang="de-DE" smtClean="0"/>
           </a:p>
           <a:p>
             <a:pPr lvl="2"/>
             <a:r>
-              <a:rPr lang="de-DE" smtClean="0"/>
+              <a:rPr lang="de-DE"/>
               <a:t>Dritte Ebene</a:t>
             </a:r>
-            <a:endParaRPr lang="de-DE" smtClean="0"/>
           </a:p>
           <a:p>
             <a:pPr lvl="3"/>
             <a:r>
-              <a:rPr lang="de-DE" smtClean="0"/>
+              <a:rPr lang="de-DE"/>
               <a:t>Vierte Ebene</a:t>
             </a:r>
-            <a:endParaRPr lang="de-DE" smtClean="0"/>
           </a:p>
           <a:p>
             <a:pPr lvl="4"/>
             <a:r>
-              <a:rPr lang="de-DE" smtClean="0"/>
+              <a:rPr lang="de-DE"/>
               <a:t>Fünfte Ebene</a:t>
             </a:r>
-            <a:endParaRPr lang="de-DE" smtClean="0"/>
           </a:p>
         </p:txBody>
       </p:sp>
@@ -741,7 +1082,6 @@
               <a:rPr lang="de-DE"/>
               <a:t>|  </a:t>
             </a:r>
-            <a:endParaRPr lang="de-DE"/>
           </a:p>
         </p:txBody>
       </p:sp>
@@ -789,6 +1129,7 @@
             </a:r>
             <a:fld id="{C36AA9A4-5D0B-4134-89A6-D8B9DAA4F25C}" type="slidenum">
               <a:rPr lang="de-DE"/>
+              <a:t>‹Nr.›</a:t>
             </a:fld>
             <a:endParaRPr lang="de-DE"/>
           </a:p>
@@ -1127,7 +1468,7 @@
 </file>
 
 <file path=ppt/slideLayouts/slideLayout1.xml><?xml version="1.0" encoding="utf-8"?>
-<p:sldLayout xmlns:a="http://schemas.openxmlformats.org/drawingml/2006/main" xmlns:r="http://schemas.openxmlformats.org/officeDocument/2006/relationships" xmlns:p="http://schemas.openxmlformats.org/presentationml/2006/main" preserve="1" showMasterSp="0" userDrawn="1">
+<p:sldLayout xmlns:a="http://schemas.openxmlformats.org/drawingml/2006/main" xmlns:r="http://schemas.openxmlformats.org/officeDocument/2006/relationships" xmlns:p="http://schemas.openxmlformats.org/presentationml/2006/main" showMasterSp="0" preserve="1" userDrawn="1">
   <p:cSld name="Titelfolie">
     <p:spTree>
       <p:nvGrpSpPr>
@@ -1211,10 +1552,9 @@
           </a:lstStyle>
           <a:p>
             <a:r>
-              <a:rPr lang="de-DE" dirty="0" smtClean="0"/>
+              <a:rPr lang="de-DE" dirty="0"/>
               <a:t>Formatvorlage des Untertitelmasters durch Klicken bearbeiten</a:t>
             </a:r>
-            <a:endParaRPr lang="de-DE" dirty="0"/>
           </a:p>
         </p:txBody>
       </p:sp>
@@ -1404,10 +1744,9 @@
           </a:lstStyle>
           <a:p>
             <a:r>
-              <a:rPr lang="de-DE" dirty="0" smtClean="0"/>
+              <a:rPr lang="de-DE" dirty="0"/>
               <a:t>Titelmasterformat durch Klicken bearbeiten</a:t>
             </a:r>
-            <a:endParaRPr lang="de-DE" dirty="0"/>
           </a:p>
         </p:txBody>
       </p:sp>
@@ -1465,9 +1804,10 @@
                 <a:ea typeface="+mn-ea"/>
                 <a:cs typeface="Tahoma" panose="020B0604030504040204" pitchFamily="34" charset="0"/>
               </a:rPr>
+              <a:t>07.12.2019</a:t>
             </a:fld>
             <a:r>
-              <a:rPr kumimoji="0" lang="de-DE" sz="1000" b="0" i="0" u="none" strike="noStrike" kern="1200" cap="none" spc="0" normalizeH="0" baseline="0" noProof="0" dirty="0" smtClean="0">
+              <a:rPr kumimoji="0" lang="de-DE" sz="1000" b="0" i="0" u="none" strike="noStrike" kern="1200" cap="none" spc="0" normalizeH="0" baseline="0" noProof="0" dirty="0">
                 <a:ln>
                   <a:noFill/>
                 </a:ln>
@@ -1484,7 +1824,7 @@
               <a:t>  |  </a:t>
             </a:r>
             <a:r>
-              <a:rPr lang="de-DE" sz="1000" noProof="0" dirty="0" smtClean="0">
+              <a:rPr lang="de-DE" sz="1000" noProof="0" dirty="0">
                 <a:ln>
                   <a:noFill/>
                 </a:ln>
@@ -1498,7 +1838,7 @@
               <a:t>Fachbereich </a:t>
             </a:r>
             <a:r>
-              <a:rPr lang="en-US" altLang="de-DE" sz="1000" noProof="0" dirty="0" smtClean="0">
+              <a:rPr lang="en-US" altLang="de-DE" sz="1000" noProof="0" dirty="0">
                 <a:ln>
                   <a:noFill/>
                 </a:ln>
@@ -1512,7 +1852,7 @@
               <a:t>20 </a:t>
             </a:r>
             <a:r>
-              <a:rPr lang="de-DE" sz="1000" noProof="0" dirty="0" smtClean="0">
+              <a:rPr lang="de-DE" sz="1000" noProof="0" dirty="0">
                 <a:ln>
                   <a:noFill/>
                 </a:ln>
@@ -1523,24 +1863,10 @@
                 <a:cs typeface="Tahoma" panose="020B0604030504040204" pitchFamily="34" charset="0"/>
                 <a:sym typeface="+mn-ea"/>
               </a:rPr>
-              <a:t>|  Institut </a:t>
-            </a:r>
-            <a:r>
-              <a:rPr lang="de-DE" sz="1000" noProof="0" dirty="0" smtClean="0">
-                <a:ln>
-                  <a:noFill/>
-                </a:ln>
-                <a:effectLst/>
-                <a:uLnTx/>
-                <a:uFillTx/>
-                <a:latin typeface="+mn-lt"/>
-                <a:cs typeface="Tahoma" panose="020B0604030504040204" pitchFamily="34" charset="0"/>
-                <a:sym typeface="+mn-ea"/>
-              </a:rPr>
-              <a:t>Visual Inference La</a:t>
-            </a:r>
-            <a:r>
-              <a:rPr lang="en-US" altLang="de-DE" sz="1000" noProof="0" dirty="0" smtClean="0">
+              <a:t>|  Institut Visual Inference La</a:t>
+            </a:r>
+            <a:r>
+              <a:rPr lang="en-US" altLang="de-DE" sz="1000" noProof="0" dirty="0">
                 <a:ln>
                   <a:noFill/>
                 </a:ln>
@@ -1554,7 +1880,7 @@
               <a:t>b</a:t>
             </a:r>
             <a:r>
-              <a:rPr lang="de-DE" sz="1000" noProof="0" dirty="0" smtClean="0">
+              <a:rPr lang="de-DE" sz="1000" noProof="0" dirty="0">
                 <a:ln>
                   <a:noFill/>
                 </a:ln>
@@ -1565,24 +1891,10 @@
                 <a:cs typeface="Tahoma" panose="020B0604030504040204" pitchFamily="34" charset="0"/>
                 <a:sym typeface="+mn-ea"/>
               </a:rPr>
-              <a:t> </a:t>
-            </a:r>
-            <a:r>
-              <a:rPr lang="de-DE" sz="1000" noProof="0" dirty="0" smtClean="0">
-                <a:ln>
-                  <a:noFill/>
-                </a:ln>
-                <a:effectLst/>
-                <a:uLnTx/>
-                <a:uFillTx/>
-                <a:latin typeface="+mn-lt"/>
-                <a:cs typeface="Tahoma" panose="020B0604030504040204" pitchFamily="34" charset="0"/>
-                <a:sym typeface="+mn-ea"/>
-              </a:rPr>
-              <a:t>|  Prof. </a:t>
-            </a:r>
-            <a:r>
-              <a:rPr lang="en-US" altLang="de-DE" sz="1000" noProof="0" dirty="0" smtClean="0">
+              <a:t> |  Prof. </a:t>
+            </a:r>
+            <a:r>
+              <a:rPr lang="en-US" altLang="de-DE" sz="1000" noProof="0" dirty="0">
                 <a:ln>
                   <a:noFill/>
                 </a:ln>
@@ -1596,7 +1908,7 @@
               <a:t>Stefan Roth </a:t>
             </a:r>
             <a:r>
-              <a:rPr lang="de-DE" sz="1000" noProof="0" dirty="0" smtClean="0">
+              <a:rPr lang="de-DE" sz="1000" noProof="0" dirty="0">
                 <a:ln>
                   <a:noFill/>
                 </a:ln>
@@ -1625,8 +1937,9 @@
                 <a:cs typeface="Tahoma" panose="020B0604030504040204" pitchFamily="34" charset="0"/>
                 <a:sym typeface="+mn-ea"/>
               </a:rPr>
+              <a:t>‹Nr.›</a:t>
             </a:fld>
-            <a:endParaRPr kumimoji="0" lang="de-DE" sz="1000" b="0" i="0" u="none" strike="noStrike" kern="1200" cap="none" spc="0" normalizeH="0" baseline="0" noProof="0" dirty="0" smtClean="0">
+            <a:endParaRPr kumimoji="0" lang="de-DE" sz="1000" b="0" i="0" u="none" strike="noStrike" kern="1200" cap="none" spc="0" normalizeH="0" baseline="0" noProof="0" dirty="0">
               <a:ln>
                 <a:noFill/>
               </a:ln>
@@ -1740,10 +2053,9 @@
           <a:lstStyle/>
           <a:p>
             <a:r>
-              <a:rPr lang="de-DE" smtClean="0"/>
+              <a:rPr lang="de-DE"/>
               <a:t>Titelmasterformat durch Klicken bearbeiten</a:t>
             </a:r>
-            <a:endParaRPr lang="de-DE"/>
           </a:p>
         </p:txBody>
       </p:sp>
@@ -1769,42 +2081,37 @@
           <a:p>
             <a:pPr lvl="0"/>
             <a:r>
-              <a:rPr lang="de-DE" dirty="0" smtClean="0"/>
+              <a:rPr lang="de-DE" dirty="0"/>
               <a:t>Textmasterformate durch Klicken bearbeiten</a:t>
             </a:r>
-            <a:endParaRPr lang="de-DE" dirty="0" smtClean="0"/>
           </a:p>
           <a:p>
             <a:pPr lvl="1"/>
             <a:r>
-              <a:rPr lang="de-DE" dirty="0" smtClean="0"/>
+              <a:rPr lang="de-DE" dirty="0"/>
               <a:t>Zweite Ebene</a:t>
             </a:r>
-            <a:endParaRPr lang="de-DE" dirty="0" smtClean="0"/>
           </a:p>
           <a:p>
             <a:pPr lvl="2"/>
             <a:r>
-              <a:rPr lang="de-DE" dirty="0" smtClean="0"/>
+              <a:rPr lang="de-DE" dirty="0"/>
               <a:t>Dritte Ebene</a:t>
             </a:r>
-            <a:endParaRPr lang="de-DE" dirty="0" smtClean="0"/>
           </a:p>
           <a:p>
             <a:pPr lvl="3"/>
             <a:r>
-              <a:rPr lang="de-DE" dirty="0" smtClean="0"/>
+              <a:rPr lang="de-DE" dirty="0"/>
               <a:t>Vierte Ebene</a:t>
             </a:r>
-            <a:endParaRPr lang="de-DE" dirty="0" smtClean="0"/>
           </a:p>
           <a:p>
             <a:pPr lvl="4"/>
             <a:r>
-              <a:rPr lang="de-DE" dirty="0" smtClean="0"/>
+              <a:rPr lang="de-DE" dirty="0"/>
               <a:t>Fünfte Ebene</a:t>
             </a:r>
-            <a:endParaRPr lang="de-DE" dirty="0"/>
           </a:p>
         </p:txBody>
       </p:sp>
@@ -1858,10 +2165,9 @@
           </a:lstStyle>
           <a:p>
             <a:r>
-              <a:rPr lang="de-DE" dirty="0" smtClean="0"/>
+              <a:rPr lang="de-DE" dirty="0"/>
               <a:t>Titelmasterformat durch Klicken bearbeiten</a:t>
             </a:r>
-            <a:endParaRPr lang="de-DE" dirty="0"/>
           </a:p>
         </p:txBody>
       </p:sp>
@@ -1924,10 +2230,9 @@
           <a:p>
             <a:pPr lvl="0"/>
             <a:r>
-              <a:rPr lang="de-DE" smtClean="0"/>
+              <a:rPr lang="de-DE"/>
               <a:t>Textmasterformate durch Klicken bearbeiten</a:t>
             </a:r>
-            <a:endParaRPr lang="de-DE" smtClean="0"/>
           </a:p>
         </p:txBody>
       </p:sp>
@@ -1972,10 +2277,9 @@
           <a:lstStyle/>
           <a:p>
             <a:r>
-              <a:rPr lang="de-DE" smtClean="0"/>
+              <a:rPr lang="de-DE"/>
               <a:t>Titelmasterformat durch Klicken bearbeiten</a:t>
             </a:r>
-            <a:endParaRPr lang="de-DE"/>
           </a:p>
         </p:txBody>
       </p:sp>
@@ -2029,42 +2333,37 @@
           <a:p>
             <a:pPr lvl="0"/>
             <a:r>
-              <a:rPr lang="de-DE" dirty="0" smtClean="0"/>
+              <a:rPr lang="de-DE" dirty="0"/>
               <a:t>Textmasterformate durch Klicken bearbeiten</a:t>
             </a:r>
-            <a:endParaRPr lang="de-DE" dirty="0" smtClean="0"/>
           </a:p>
           <a:p>
             <a:pPr lvl="1"/>
             <a:r>
-              <a:rPr lang="de-DE" dirty="0" smtClean="0"/>
+              <a:rPr lang="de-DE" dirty="0"/>
               <a:t>Zweite Ebene</a:t>
             </a:r>
-            <a:endParaRPr lang="de-DE" dirty="0" smtClean="0"/>
           </a:p>
           <a:p>
             <a:pPr lvl="2"/>
             <a:r>
-              <a:rPr lang="de-DE" dirty="0" smtClean="0"/>
+              <a:rPr lang="de-DE" dirty="0"/>
               <a:t>Dritte Ebene</a:t>
             </a:r>
-            <a:endParaRPr lang="de-DE" dirty="0" smtClean="0"/>
           </a:p>
           <a:p>
             <a:pPr lvl="3"/>
             <a:r>
-              <a:rPr lang="de-DE" dirty="0" smtClean="0"/>
+              <a:rPr lang="de-DE" dirty="0"/>
               <a:t>Vierte Ebene</a:t>
             </a:r>
-            <a:endParaRPr lang="de-DE" dirty="0" smtClean="0"/>
           </a:p>
           <a:p>
             <a:pPr lvl="4"/>
             <a:r>
-              <a:rPr lang="de-DE" dirty="0" smtClean="0"/>
+              <a:rPr lang="de-DE" dirty="0"/>
               <a:t>Fünfte Ebene</a:t>
             </a:r>
-            <a:endParaRPr lang="de-DE" dirty="0"/>
           </a:p>
         </p:txBody>
       </p:sp>
@@ -2118,42 +2417,37 @@
           <a:p>
             <a:pPr lvl="0"/>
             <a:r>
-              <a:rPr lang="de-DE" dirty="0" smtClean="0"/>
+              <a:rPr lang="de-DE" dirty="0"/>
               <a:t>Textmasterformate durch Klicken bearbeiten</a:t>
             </a:r>
-            <a:endParaRPr lang="de-DE" dirty="0" smtClean="0"/>
           </a:p>
           <a:p>
             <a:pPr lvl="1"/>
             <a:r>
-              <a:rPr lang="de-DE" dirty="0" smtClean="0"/>
+              <a:rPr lang="de-DE" dirty="0"/>
               <a:t>Zweite Ebene</a:t>
             </a:r>
-            <a:endParaRPr lang="de-DE" dirty="0" smtClean="0"/>
           </a:p>
           <a:p>
             <a:pPr lvl="2"/>
             <a:r>
-              <a:rPr lang="de-DE" dirty="0" smtClean="0"/>
+              <a:rPr lang="de-DE" dirty="0"/>
               <a:t>Dritte Ebene</a:t>
             </a:r>
-            <a:endParaRPr lang="de-DE" dirty="0" smtClean="0"/>
           </a:p>
           <a:p>
             <a:pPr lvl="3"/>
             <a:r>
-              <a:rPr lang="de-DE" dirty="0" smtClean="0"/>
+              <a:rPr lang="de-DE" dirty="0"/>
               <a:t>Vierte Ebene</a:t>
             </a:r>
-            <a:endParaRPr lang="de-DE" dirty="0" smtClean="0"/>
           </a:p>
           <a:p>
             <a:pPr lvl="4"/>
             <a:r>
-              <a:rPr lang="de-DE" dirty="0" smtClean="0"/>
+              <a:rPr lang="de-DE" dirty="0"/>
               <a:t>Fünfte Ebene</a:t>
             </a:r>
-            <a:endParaRPr lang="de-DE" dirty="0"/>
           </a:p>
         </p:txBody>
       </p:sp>
@@ -2198,10 +2492,9 @@
           <a:lstStyle/>
           <a:p>
             <a:r>
-              <a:rPr lang="de-DE" dirty="0" smtClean="0"/>
+              <a:rPr lang="de-DE" dirty="0"/>
               <a:t>Titelmasterformat durch Klicken bearbeiten</a:t>
             </a:r>
-            <a:endParaRPr lang="de-DE" dirty="0"/>
           </a:p>
         </p:txBody>
       </p:sp>
@@ -2305,42 +2598,37 @@
           <a:p>
             <a:pPr lvl="0"/>
             <a:r>
-              <a:rPr lang="de-DE" dirty="0" smtClean="0"/>
+              <a:rPr lang="de-DE" dirty="0"/>
               <a:t>Textmasterformate durch Klicken bearbeiten</a:t>
             </a:r>
-            <a:endParaRPr lang="de-DE" dirty="0" smtClean="0"/>
           </a:p>
           <a:p>
             <a:pPr lvl="1"/>
             <a:r>
-              <a:rPr lang="de-DE" dirty="0" smtClean="0"/>
+              <a:rPr lang="de-DE" dirty="0"/>
               <a:t>Zweite Ebene</a:t>
             </a:r>
-            <a:endParaRPr lang="de-DE" dirty="0" smtClean="0"/>
           </a:p>
           <a:p>
             <a:pPr lvl="2"/>
             <a:r>
-              <a:rPr lang="de-DE" dirty="0" smtClean="0"/>
+              <a:rPr lang="de-DE" dirty="0"/>
               <a:t>Dritte Ebene</a:t>
             </a:r>
-            <a:endParaRPr lang="de-DE" dirty="0" smtClean="0"/>
           </a:p>
           <a:p>
             <a:pPr lvl="3"/>
             <a:r>
-              <a:rPr lang="de-DE" dirty="0" smtClean="0"/>
+              <a:rPr lang="de-DE" dirty="0"/>
               <a:t>Vierte Ebene</a:t>
             </a:r>
-            <a:endParaRPr lang="de-DE" dirty="0" smtClean="0"/>
           </a:p>
           <a:p>
             <a:pPr lvl="4"/>
             <a:r>
-              <a:rPr lang="de-DE" dirty="0" smtClean="0"/>
+              <a:rPr lang="de-DE" dirty="0"/>
               <a:t>Fünfte Ebene</a:t>
             </a:r>
-            <a:endParaRPr lang="de-DE" dirty="0"/>
           </a:p>
         </p:txBody>
       </p:sp>
@@ -2403,10 +2691,9 @@
           <a:p>
             <a:pPr lvl="0"/>
             <a:r>
-              <a:rPr lang="de-DE" dirty="0" smtClean="0"/>
+              <a:rPr lang="de-DE" dirty="0"/>
               <a:t>Textmasterformate durch Klicken bearbeiten</a:t>
             </a:r>
-            <a:endParaRPr lang="de-DE" dirty="0" smtClean="0"/>
           </a:p>
         </p:txBody>
       </p:sp>
@@ -2431,10 +2718,9 @@
           <a:lstStyle/>
           <a:p>
             <a:r>
-              <a:rPr lang="de-DE" smtClean="0"/>
+              <a:rPr lang="de-DE"/>
               <a:t>Titelmasterformat durch Klicken bearbeiten</a:t>
             </a:r>
-            <a:endParaRPr lang="de-DE"/>
           </a:p>
         </p:txBody>
       </p:sp>
@@ -2488,10 +2774,9 @@
           </a:lstStyle>
           <a:p>
             <a:r>
-              <a:rPr lang="de-DE" smtClean="0"/>
+              <a:rPr lang="de-DE"/>
               <a:t>Titelmasterformat durch Klicken bearbeiten</a:t>
             </a:r>
-            <a:endParaRPr lang="de-DE"/>
           </a:p>
         </p:txBody>
       </p:sp>
@@ -2553,10 +2838,9 @@
           </a:lstStyle>
           <a:p>
             <a:r>
-              <a:rPr lang="de-DE" smtClean="0"/>
+              <a:rPr lang="de-DE"/>
               <a:t>Bild durch Klicken auf Symbol hinzufügen</a:t>
             </a:r>
-            <a:endParaRPr lang="de-DE"/>
           </a:p>
         </p:txBody>
       </p:sp>
@@ -2619,10 +2903,9 @@
           <a:p>
             <a:pPr lvl="0"/>
             <a:r>
-              <a:rPr lang="de-DE" smtClean="0"/>
+              <a:rPr lang="de-DE"/>
               <a:t>Textmasterformate durch Klicken bearbeiten</a:t>
             </a:r>
-            <a:endParaRPr lang="de-DE" smtClean="0"/>
           </a:p>
         </p:txBody>
       </p:sp>
@@ -2724,10 +3007,9 @@
           <a:p>
             <a:pPr lvl="0"/>
             <a:r>
-              <a:rPr lang="de-DE" dirty="0" smtClean="0"/>
+              <a:rPr lang="de-DE" dirty="0"/>
               <a:t>Titelmasterformat durch Klicken bearbeiten</a:t>
             </a:r>
-            <a:endParaRPr lang="de-DE" dirty="0" smtClean="0"/>
           </a:p>
         </p:txBody>
       </p:sp>
@@ -2762,42 +3044,37 @@
           <a:p>
             <a:pPr lvl="0"/>
             <a:r>
-              <a:rPr lang="de-DE" dirty="0" smtClean="0"/>
+              <a:rPr lang="de-DE" dirty="0"/>
               <a:t>Textmasterformate durch Klicken bearbeiten</a:t>
             </a:r>
-            <a:endParaRPr lang="de-DE" dirty="0" smtClean="0"/>
           </a:p>
           <a:p>
             <a:pPr lvl="1"/>
             <a:r>
-              <a:rPr lang="de-DE" dirty="0" smtClean="0"/>
+              <a:rPr lang="de-DE" dirty="0"/>
               <a:t>Zweite Ebene</a:t>
             </a:r>
-            <a:endParaRPr lang="de-DE" dirty="0" smtClean="0"/>
           </a:p>
           <a:p>
             <a:pPr lvl="2"/>
             <a:r>
-              <a:rPr lang="de-DE" dirty="0" smtClean="0"/>
+              <a:rPr lang="de-DE" dirty="0"/>
               <a:t>Dritte Ebene</a:t>
             </a:r>
-            <a:endParaRPr lang="de-DE" dirty="0" smtClean="0"/>
           </a:p>
           <a:p>
             <a:pPr lvl="3"/>
             <a:r>
-              <a:rPr lang="de-DE" dirty="0" smtClean="0"/>
+              <a:rPr lang="de-DE" dirty="0"/>
               <a:t>Vierte Ebene</a:t>
             </a:r>
-            <a:endParaRPr lang="de-DE" dirty="0" smtClean="0"/>
           </a:p>
           <a:p>
             <a:pPr lvl="4"/>
             <a:r>
-              <a:rPr lang="de-DE" dirty="0" smtClean="0"/>
+              <a:rPr lang="de-DE" dirty="0"/>
               <a:t>Fünfte Ebene</a:t>
             </a:r>
-            <a:endParaRPr lang="de-DE" dirty="0" smtClean="0"/>
           </a:p>
         </p:txBody>
       </p:sp>
@@ -2845,7 +3122,7 @@
           <p:nvPr/>
         </p:nvPicPr>
         <p:blipFill>
-          <a:blip r:embed="rId9" cstate="print"/>
+          <a:blip r:embed="rId10" cstate="print"/>
           <a:srcRect r="5453"/>
           <a:stretch>
             <a:fillRect/>
@@ -3028,9 +3305,10 @@
                 <a:ea typeface="+mn-ea"/>
                 <a:cs typeface="Tahoma" panose="020B0604030504040204" pitchFamily="34" charset="0"/>
               </a:rPr>
+              <a:t>07.12.2019</a:t>
             </a:fld>
             <a:r>
-              <a:rPr kumimoji="0" lang="de-DE" sz="1000" b="0" i="0" u="none" strike="noStrike" kern="1200" cap="none" spc="0" normalizeH="0" baseline="0" noProof="0" dirty="0" smtClean="0">
+              <a:rPr kumimoji="0" lang="de-DE" sz="1000" b="0" i="0" u="none" strike="noStrike" kern="1200" cap="none" spc="0" normalizeH="0" baseline="0" noProof="0" dirty="0">
                 <a:ln>
                   <a:noFill/>
                 </a:ln>
@@ -3047,7 +3325,7 @@
               <a:t>  |  Fachbereich </a:t>
             </a:r>
             <a:r>
-              <a:rPr kumimoji="0" lang="en-US" altLang="de-DE" sz="1000" b="0" i="0" u="none" strike="noStrike" kern="1200" cap="none" spc="0" normalizeH="0" baseline="0" noProof="0" dirty="0" smtClean="0">
+              <a:rPr kumimoji="0" lang="en-US" altLang="de-DE" sz="1000" b="0" i="0" u="none" strike="noStrike" kern="1200" cap="none" spc="0" normalizeH="0" baseline="0" noProof="0" dirty="0">
                 <a:ln>
                   <a:noFill/>
                 </a:ln>
@@ -3064,7 +3342,7 @@
               <a:t>20 </a:t>
             </a:r>
             <a:r>
-              <a:rPr kumimoji="0" lang="de-DE" sz="1000" b="0" i="0" u="none" strike="noStrike" kern="1200" cap="none" spc="0" normalizeH="0" baseline="0" noProof="0" dirty="0" smtClean="0">
+              <a:rPr kumimoji="0" lang="de-DE" sz="1000" b="0" i="0" u="none" strike="noStrike" kern="1200" cap="none" spc="0" normalizeH="0" baseline="0" noProof="0" dirty="0">
                 <a:ln>
                   <a:noFill/>
                 </a:ln>
@@ -3081,7 +3359,7 @@
               <a:t>|  Institut </a:t>
             </a:r>
             <a:r>
-              <a:rPr lang="de-DE" sz="1000" noProof="0" dirty="0" smtClean="0">
+              <a:rPr lang="de-DE" sz="1000" noProof="0" dirty="0">
                 <a:ln>
                   <a:noFill/>
                 </a:ln>
@@ -3095,7 +3373,7 @@
               <a:t>Visual Inference La</a:t>
             </a:r>
             <a:r>
-              <a:rPr lang="en-US" altLang="de-DE" sz="1000" noProof="0" dirty="0" smtClean="0">
+              <a:rPr lang="en-US" altLang="de-DE" sz="1000" noProof="0" dirty="0">
                 <a:ln>
                   <a:noFill/>
                 </a:ln>
@@ -3109,7 +3387,7 @@
               <a:t>b</a:t>
             </a:r>
             <a:r>
-              <a:rPr lang="de-DE" sz="1000" noProof="0" dirty="0" smtClean="0">
+              <a:rPr lang="de-DE" sz="1000" noProof="0" dirty="0">
                 <a:ln>
                   <a:noFill/>
                 </a:ln>
@@ -3123,7 +3401,7 @@
               <a:t> </a:t>
             </a:r>
             <a:r>
-              <a:rPr kumimoji="0" lang="de-DE" sz="1000" b="0" i="0" u="none" strike="noStrike" kern="1200" cap="none" spc="0" normalizeH="0" baseline="0" noProof="0" dirty="0" smtClean="0">
+              <a:rPr kumimoji="0" lang="de-DE" sz="1000" b="0" i="0" u="none" strike="noStrike" kern="1200" cap="none" spc="0" normalizeH="0" baseline="0" noProof="0" dirty="0">
                 <a:ln>
                   <a:noFill/>
                 </a:ln>
@@ -3140,7 +3418,7 @@
               <a:t>|  Prof. </a:t>
             </a:r>
             <a:r>
-              <a:rPr kumimoji="0" lang="en-US" altLang="de-DE" sz="1000" b="0" i="0" u="none" strike="noStrike" kern="1200" cap="none" spc="0" normalizeH="0" baseline="0" noProof="0" dirty="0" smtClean="0">
+              <a:rPr kumimoji="0" lang="en-US" altLang="de-DE" sz="1000" b="0" i="0" u="none" strike="noStrike" kern="1200" cap="none" spc="0" normalizeH="0" baseline="0" noProof="0" dirty="0">
                 <a:ln>
                   <a:noFill/>
                 </a:ln>
@@ -3157,7 +3435,7 @@
               <a:t>Stefan Roth </a:t>
             </a:r>
             <a:r>
-              <a:rPr kumimoji="0" lang="de-DE" sz="1000" b="0" i="0" u="none" strike="noStrike" kern="1200" cap="none" spc="0" normalizeH="0" baseline="0" noProof="0" dirty="0" smtClean="0">
+              <a:rPr kumimoji="0" lang="de-DE" sz="1000" b="0" i="0" u="none" strike="noStrike" kern="1200" cap="none" spc="0" normalizeH="0" baseline="0" noProof="0" dirty="0">
                 <a:ln>
                   <a:noFill/>
                 </a:ln>
@@ -3188,8 +3466,9 @@
                 <a:ea typeface="+mn-ea"/>
                 <a:cs typeface="Tahoma" panose="020B0604030504040204" pitchFamily="34" charset="0"/>
               </a:rPr>
+              <a:t>‹Nr.›</a:t>
             </a:fld>
-            <a:endParaRPr kumimoji="0" lang="de-DE" sz="1000" b="0" i="0" u="none" strike="noStrike" kern="1200" cap="none" spc="0" normalizeH="0" baseline="0" noProof="0" dirty="0" smtClean="0">
+            <a:endParaRPr kumimoji="0" lang="de-DE" sz="1000" b="0" i="0" u="none" strike="noStrike" kern="1200" cap="none" spc="0" normalizeH="0" baseline="0" noProof="0" dirty="0">
               <a:ln>
                 <a:noFill/>
               </a:ln>
@@ -3247,7 +3526,7 @@
           <p:nvPr userDrawn="1"/>
         </p:nvPicPr>
         <p:blipFill>
-          <a:blip r:embed="rId10"/>
+          <a:blip r:embed="rId11"/>
           <a:stretch>
             <a:fillRect/>
           </a:stretch>
@@ -3711,8 +3990,8 @@
           <a:lstStyle/>
           <a:p>
             <a:r>
-              <a:rPr lang="en-US" altLang="de-DE" dirty="0"/>
-              <a:t>Weekly Topic:</a:t>
+              <a:rPr lang="en-US" altLang="de-DE"/>
+              <a:t>Topic:</a:t>
             </a:r>
             <a:endParaRPr lang="en-US" altLang="de-DE" dirty="0"/>
           </a:p>
@@ -3749,7 +4028,6 @@
               <a:rPr lang="en-US" altLang="de-DE" dirty="0"/>
               <a:t>Piecewise monocular depth estimation by plane fitting</a:t>
             </a:r>
-            <a:endParaRPr lang="en-US" altLang="de-DE" dirty="0"/>
           </a:p>
         </p:txBody>
       </p:sp>
@@ -3758,13 +4036,6 @@
   <p:clrMapOvr>
     <a:masterClrMapping/>
   </p:clrMapOvr>
-  <p:timing>
-    <p:tnLst>
-      <p:par>
-        <p:cTn id="1" dur="indefinite" restart="never" nodeType="tmRoot"/>
-      </p:par>
-    </p:tnLst>
-  </p:timing>
 </p:sld>
 </file>
 
@@ -3988,6 +4259,7 @@
       </a:bgFillStyleLst>
     </a:fmtScheme>
   </a:themeElements>
+  <a:objectDefaults/>
   <a:extraClrSchemeLst>
     <a:extraClrScheme>
       <a:clrScheme name="v1_TUD_Präsentation_rot 1">
@@ -4768,6 +5040,8 @@
       </a:bgFillStyleLst>
     </a:fmtScheme>
   </a:themeElements>
+  <a:objectDefaults/>
+  <a:extraClrSchemeLst/>
   <a:extLst>
     <a:ext uri="{05A4C25C-085E-4340-85A3-A5531E510DB2}">
       <thm15:themeFamily xmlns:thm15="http://schemas.microsoft.com/office/thememl/2012/main" name="Office Theme" id="{62F939B6-93AF-4DB8-9C6B-D6C7DFDC589F}" vid="{4A3C46E8-61CC-4603-A589-7422A47A8E4A}"/>
@@ -5054,6 +5328,8 @@
       </a:bgFillStyleLst>
     </a:fmtScheme>
   </a:themeElements>
+  <a:objectDefaults/>
+  <a:extraClrSchemeLst/>
   <a:extLst>
     <a:ext uri="{05A4C25C-085E-4340-85A3-A5531E510DB2}">
       <thm15:themeFamily xmlns:thm15="http://schemas.microsoft.com/office/thememl/2012/main" name="Office Theme" id="{62F939B6-93AF-4DB8-9C6B-D6C7DFDC589F}" vid="{4A3C46E8-61CC-4603-A589-7422A47A8E4A}"/>

</xml_diff>